<commit_message>
updating powerpoints and changing recruitment to enrollment
</commit_message>
<xml_diff>
--- a/code/recruitment figures/recruitment outcomes bar plot/RecruitmentOutcomes.pptx
+++ b/code/recruitment figures/recruitment outcomes bar plot/RecruitmentOutcomes.pptx
@@ -105,6 +105,11 @@
       </a:defRPr>
     </a:lvl9pPr>
   </p:defaultTextStyle>
+  <p:extLst>
+    <p:ext uri="{EFAFB233-063F-42B5-8137-9DF3F51BA10A}">
+      <p15:sldGuideLst xmlns:p15="http://schemas.microsoft.com/office/powerpoint/2012/main"/>
+    </p:ext>
+  </p:extLst>
 </p:presentation>
 </file>
 
@@ -255,7 +260,7 @@
           <a:p>
             <a:fld id="{DCF65191-E4EE-4D5F-AD65-F26219543CA3}" type="datetimeFigureOut">
               <a:rPr lang="en-US" smtClean="0"/>
-              <a:t>6/19/2024</a:t>
+              <a:t>6/20/2024</a:t>
             </a:fld>
             <a:endParaRPr lang="en-US"/>
           </a:p>
@@ -453,7 +458,7 @@
           <a:p>
             <a:fld id="{DCF65191-E4EE-4D5F-AD65-F26219543CA3}" type="datetimeFigureOut">
               <a:rPr lang="en-US" smtClean="0"/>
-              <a:t>6/19/2024</a:t>
+              <a:t>6/20/2024</a:t>
             </a:fld>
             <a:endParaRPr lang="en-US"/>
           </a:p>
@@ -661,7 +666,7 @@
           <a:p>
             <a:fld id="{DCF65191-E4EE-4D5F-AD65-F26219543CA3}" type="datetimeFigureOut">
               <a:rPr lang="en-US" smtClean="0"/>
-              <a:t>6/19/2024</a:t>
+              <a:t>6/20/2024</a:t>
             </a:fld>
             <a:endParaRPr lang="en-US"/>
           </a:p>
@@ -859,7 +864,7 @@
           <a:p>
             <a:fld id="{DCF65191-E4EE-4D5F-AD65-F26219543CA3}" type="datetimeFigureOut">
               <a:rPr lang="en-US" smtClean="0"/>
-              <a:t>6/19/2024</a:t>
+              <a:t>6/20/2024</a:t>
             </a:fld>
             <a:endParaRPr lang="en-US"/>
           </a:p>
@@ -1134,7 +1139,7 @@
           <a:p>
             <a:fld id="{DCF65191-E4EE-4D5F-AD65-F26219543CA3}" type="datetimeFigureOut">
               <a:rPr lang="en-US" smtClean="0"/>
-              <a:t>6/19/2024</a:t>
+              <a:t>6/20/2024</a:t>
             </a:fld>
             <a:endParaRPr lang="en-US"/>
           </a:p>
@@ -1399,7 +1404,7 @@
           <a:p>
             <a:fld id="{DCF65191-E4EE-4D5F-AD65-F26219543CA3}" type="datetimeFigureOut">
               <a:rPr lang="en-US" smtClean="0"/>
-              <a:t>6/19/2024</a:t>
+              <a:t>6/20/2024</a:t>
             </a:fld>
             <a:endParaRPr lang="en-US"/>
           </a:p>
@@ -1811,7 +1816,7 @@
           <a:p>
             <a:fld id="{DCF65191-E4EE-4D5F-AD65-F26219543CA3}" type="datetimeFigureOut">
               <a:rPr lang="en-US" smtClean="0"/>
-              <a:t>6/19/2024</a:t>
+              <a:t>6/20/2024</a:t>
             </a:fld>
             <a:endParaRPr lang="en-US"/>
           </a:p>
@@ -1952,7 +1957,7 @@
           <a:p>
             <a:fld id="{DCF65191-E4EE-4D5F-AD65-F26219543CA3}" type="datetimeFigureOut">
               <a:rPr lang="en-US" smtClean="0"/>
-              <a:t>6/19/2024</a:t>
+              <a:t>6/20/2024</a:t>
             </a:fld>
             <a:endParaRPr lang="en-US"/>
           </a:p>
@@ -2065,7 +2070,7 @@
           <a:p>
             <a:fld id="{DCF65191-E4EE-4D5F-AD65-F26219543CA3}" type="datetimeFigureOut">
               <a:rPr lang="en-US" smtClean="0"/>
-              <a:t>6/19/2024</a:t>
+              <a:t>6/20/2024</a:t>
             </a:fld>
             <a:endParaRPr lang="en-US"/>
           </a:p>
@@ -2376,7 +2381,7 @@
           <a:p>
             <a:fld id="{DCF65191-E4EE-4D5F-AD65-F26219543CA3}" type="datetimeFigureOut">
               <a:rPr lang="en-US" smtClean="0"/>
-              <a:t>6/19/2024</a:t>
+              <a:t>6/20/2024</a:t>
             </a:fld>
             <a:endParaRPr lang="en-US"/>
           </a:p>
@@ -2664,7 +2669,7 @@
           <a:p>
             <a:fld id="{DCF65191-E4EE-4D5F-AD65-F26219543CA3}" type="datetimeFigureOut">
               <a:rPr lang="en-US" smtClean="0"/>
-              <a:t>6/19/2024</a:t>
+              <a:t>6/20/2024</a:t>
             </a:fld>
             <a:endParaRPr lang="en-US"/>
           </a:p>
@@ -2905,7 +2910,7 @@
           <a:p>
             <a:fld id="{DCF65191-E4EE-4D5F-AD65-F26219543CA3}" type="datetimeFigureOut">
               <a:rPr lang="en-US" smtClean="0"/>
-              <a:t>6/19/2024</a:t>
+              <a:t>6/20/2024</a:t>
             </a:fld>
             <a:endParaRPr lang="en-US"/>
           </a:p>
@@ -3324,7 +3329,7 @@
       </p:grpSpPr>
       <p:pic>
         <p:nvPicPr>
-          <p:cNvPr id="5" name="Picture 4" descr="A graph of different colored squares&#10;&#10;Description automatically generated">
+          <p:cNvPr id="5" name="Picture 4">
             <a:extLst>
               <a:ext uri="{FF2B5EF4-FFF2-40B4-BE49-F238E27FC236}">
                 <a16:creationId xmlns:a16="http://schemas.microsoft.com/office/drawing/2014/main" id="{55203D50-6405-747B-7CDA-68E818C434A6}"/>
@@ -3344,14 +3349,13 @@
               </a:ext>
             </a:extLst>
           </a:blip>
-          <a:stretch>
-            <a:fillRect/>
-          </a:stretch>
+          <a:srcRect/>
+          <a:stretch/>
         </p:blipFill>
         <p:spPr>
           <a:xfrm>
             <a:off x="383458" y="0"/>
-            <a:ext cx="11425084" cy="6855050"/>
+            <a:ext cx="11425083" cy="6855050"/>
           </a:xfrm>
           <a:prstGeom prst="rect">
             <a:avLst/>
@@ -3425,7 +3429,7 @@
       </p:grpSpPr>
       <p:pic>
         <p:nvPicPr>
-          <p:cNvPr id="3" name="Picture 2" descr="A graph of different colored rectangles&#10;&#10;Description automatically generated">
+          <p:cNvPr id="3" name="Picture 2">
             <a:extLst>
               <a:ext uri="{FF2B5EF4-FFF2-40B4-BE49-F238E27FC236}">
                 <a16:creationId xmlns:a16="http://schemas.microsoft.com/office/drawing/2014/main" id="{57B480CA-B375-1689-8F91-D426FECA6C87}"/>
@@ -3445,9 +3449,8 @@
               </a:ext>
             </a:extLst>
           </a:blip>
-          <a:stretch>
-            <a:fillRect/>
-          </a:stretch>
+          <a:srcRect/>
+          <a:stretch/>
         </p:blipFill>
         <p:spPr>
           <a:xfrm>

</xml_diff>